<commit_message>
updated title, removed HD
</commit_message>
<xml_diff>
--- a/docs/CDC 2017 Safe Tracking/fig/framework_online.pptx
+++ b/docs/CDC 2017 Safe Tracking/fig/framework_online.pptx
@@ -243,7 +243,7 @@
           <a:p>
             <a:fld id="{C48BF103-B019-4C03-B7DF-16D4A730CE6A}" type="datetimeFigureOut">
               <a:rPr lang="en-US" smtClean="0"/>
-              <a:t>3/15/17</a:t>
+              <a:t>3/19/17</a:t>
             </a:fld>
             <a:endParaRPr lang="en-US"/>
           </a:p>
@@ -413,7 +413,7 @@
           <a:p>
             <a:fld id="{C48BF103-B019-4C03-B7DF-16D4A730CE6A}" type="datetimeFigureOut">
               <a:rPr lang="en-US" smtClean="0"/>
-              <a:t>3/15/17</a:t>
+              <a:t>3/19/17</a:t>
             </a:fld>
             <a:endParaRPr lang="en-US"/>
           </a:p>
@@ -593,7 +593,7 @@
           <a:p>
             <a:fld id="{C48BF103-B019-4C03-B7DF-16D4A730CE6A}" type="datetimeFigureOut">
               <a:rPr lang="en-US" smtClean="0"/>
-              <a:t>3/15/17</a:t>
+              <a:t>3/19/17</a:t>
             </a:fld>
             <a:endParaRPr lang="en-US"/>
           </a:p>
@@ -763,7 +763,7 @@
           <a:p>
             <a:fld id="{C48BF103-B019-4C03-B7DF-16D4A730CE6A}" type="datetimeFigureOut">
               <a:rPr lang="en-US" smtClean="0"/>
-              <a:t>3/15/17</a:t>
+              <a:t>3/19/17</a:t>
             </a:fld>
             <a:endParaRPr lang="en-US"/>
           </a:p>
@@ -1009,7 +1009,7 @@
           <a:p>
             <a:fld id="{C48BF103-B019-4C03-B7DF-16D4A730CE6A}" type="datetimeFigureOut">
               <a:rPr lang="en-US" smtClean="0"/>
-              <a:t>3/15/17</a:t>
+              <a:t>3/19/17</a:t>
             </a:fld>
             <a:endParaRPr lang="en-US"/>
           </a:p>
@@ -1241,7 +1241,7 @@
           <a:p>
             <a:fld id="{C48BF103-B019-4C03-B7DF-16D4A730CE6A}" type="datetimeFigureOut">
               <a:rPr lang="en-US" smtClean="0"/>
-              <a:t>3/15/17</a:t>
+              <a:t>3/19/17</a:t>
             </a:fld>
             <a:endParaRPr lang="en-US"/>
           </a:p>
@@ -1608,7 +1608,7 @@
           <a:p>
             <a:fld id="{C48BF103-B019-4C03-B7DF-16D4A730CE6A}" type="datetimeFigureOut">
               <a:rPr lang="en-US" smtClean="0"/>
-              <a:t>3/15/17</a:t>
+              <a:t>3/19/17</a:t>
             </a:fld>
             <a:endParaRPr lang="en-US"/>
           </a:p>
@@ -1726,7 +1726,7 @@
           <a:p>
             <a:fld id="{C48BF103-B019-4C03-B7DF-16D4A730CE6A}" type="datetimeFigureOut">
               <a:rPr lang="en-US" smtClean="0"/>
-              <a:t>3/15/17</a:t>
+              <a:t>3/19/17</a:t>
             </a:fld>
             <a:endParaRPr lang="en-US"/>
           </a:p>
@@ -1821,7 +1821,7 @@
           <a:p>
             <a:fld id="{C48BF103-B019-4C03-B7DF-16D4A730CE6A}" type="datetimeFigureOut">
               <a:rPr lang="en-US" smtClean="0"/>
-              <a:t>3/15/17</a:t>
+              <a:t>3/19/17</a:t>
             </a:fld>
             <a:endParaRPr lang="en-US"/>
           </a:p>
@@ -2098,7 +2098,7 @@
           <a:p>
             <a:fld id="{C48BF103-B019-4C03-B7DF-16D4A730CE6A}" type="datetimeFigureOut">
               <a:rPr lang="en-US" smtClean="0"/>
-              <a:t>3/15/17</a:t>
+              <a:t>3/19/17</a:t>
             </a:fld>
             <a:endParaRPr lang="en-US"/>
           </a:p>
@@ -2355,7 +2355,7 @@
           <a:p>
             <a:fld id="{C48BF103-B019-4C03-B7DF-16D4A730CE6A}" type="datetimeFigureOut">
               <a:rPr lang="en-US" smtClean="0"/>
-              <a:t>3/15/17</a:t>
+              <a:t>3/19/17</a:t>
             </a:fld>
             <a:endParaRPr lang="en-US"/>
           </a:p>
@@ -2568,7 +2568,7 @@
           <a:p>
             <a:fld id="{C48BF103-B019-4C03-B7DF-16D4A730CE6A}" type="datetimeFigureOut">
               <a:rPr lang="en-US" smtClean="0"/>
-              <a:t>3/15/17</a:t>
+              <a:t>3/19/17</a:t>
             </a:fld>
             <a:endParaRPr lang="en-US"/>
           </a:p>
@@ -2996,7 +2996,7 @@
           <p:spPr>
             <a:xfrm>
               <a:off x="570218" y="1212351"/>
-              <a:ext cx="1088878" cy="914400"/>
+              <a:ext cx="1232908" cy="914400"/>
             </a:xfrm>
             <a:prstGeom prst="roundRect">
               <a:avLst/>
@@ -3022,10 +3022,10 @@
             <a:p>
               <a:pPr algn="ctr"/>
               <a:r>
-                <a:rPr lang="en-US" smtClean="0"/>
+                <a:rPr lang="en-US" sz="2000" smtClean="0"/>
                 <a:t>Planning system</a:t>
               </a:r>
-              <a:endParaRPr lang="en-US" dirty="0"/>
+              <a:endParaRPr lang="en-US" sz="2000" dirty="0"/>
             </a:p>
           </p:txBody>
         </p:sp>
@@ -3037,8 +3037,8 @@
           </p:nvSpPr>
           <p:spPr>
             <a:xfrm>
-              <a:off x="570219" y="3424720"/>
-              <a:ext cx="1068513" cy="914400"/>
+              <a:off x="570218" y="3424720"/>
+              <a:ext cx="1232907" cy="914400"/>
             </a:xfrm>
             <a:prstGeom prst="roundRect">
               <a:avLst/>
@@ -3064,10 +3064,10 @@
             <a:p>
               <a:pPr algn="ctr"/>
               <a:r>
-                <a:rPr lang="en-US" dirty="0" smtClean="0"/>
+                <a:rPr lang="en-US" sz="2000" dirty="0" smtClean="0"/>
                 <a:t>Tracking system</a:t>
               </a:r>
-              <a:endParaRPr lang="en-US" dirty="0"/>
+              <a:endParaRPr lang="en-US" sz="2000" dirty="0"/>
             </a:p>
           </p:txBody>
         </p:sp>
@@ -3079,8 +3079,8 @@
           </p:nvSpPr>
           <p:spPr>
             <a:xfrm>
-              <a:off x="3159303" y="1212351"/>
-              <a:ext cx="1751744" cy="914400"/>
+              <a:off x="3305796" y="1204002"/>
+              <a:ext cx="1858222" cy="914400"/>
             </a:xfrm>
             <a:prstGeom prst="roundRect">
               <a:avLst/>
@@ -3106,7 +3106,7 @@
             <a:p>
               <a:pPr algn="ctr"/>
               <a:r>
-                <a:rPr lang="en-US" dirty="0"/>
+                <a:rPr lang="en-US" sz="2000" dirty="0"/>
                 <a:t>Path/trajectory planner</a:t>
               </a:r>
             </a:p>
@@ -3123,7 +3123,7 @@
           </p:nvCxnSpPr>
           <p:spPr>
             <a:xfrm>
-              <a:off x="8026621" y="495965"/>
+              <a:off x="8026745" y="467466"/>
               <a:ext cx="0" cy="744884"/>
             </a:xfrm>
             <a:prstGeom prst="straightConnector1">
@@ -3160,8 +3160,8 @@
           </p:nvCxnSpPr>
           <p:spPr>
             <a:xfrm flipH="1" flipV="1">
-              <a:off x="4911047" y="1669551"/>
-              <a:ext cx="2323209" cy="28499"/>
+              <a:off x="5164018" y="1661202"/>
+              <a:ext cx="2070362" cy="8349"/>
             </a:xfrm>
             <a:prstGeom prst="straightConnector1">
               <a:avLst/>
@@ -3196,8 +3196,8 @@
           </p:nvCxnSpPr>
           <p:spPr>
             <a:xfrm flipV="1">
-              <a:off x="1104474" y="2126751"/>
-              <a:ext cx="10183" cy="883578"/>
+              <a:off x="1186672" y="2126751"/>
+              <a:ext cx="0" cy="883577"/>
             </a:xfrm>
             <a:prstGeom prst="straightConnector1">
               <a:avLst/>
@@ -3232,8 +3232,8 @@
           </p:nvCxnSpPr>
           <p:spPr>
             <a:xfrm>
-              <a:off x="1104475" y="3010328"/>
-              <a:ext cx="1" cy="414392"/>
+              <a:off x="1186672" y="3010328"/>
+              <a:ext cx="0" cy="414392"/>
             </a:xfrm>
             <a:prstGeom prst="line">
               <a:avLst/>
@@ -3264,8 +3264,8 @@
           </p:nvCxnSpPr>
           <p:spPr>
             <a:xfrm>
-              <a:off x="1104474" y="3010328"/>
-              <a:ext cx="5866536" cy="20232"/>
+              <a:off x="1186672" y="3010328"/>
+              <a:ext cx="5784338" cy="20232"/>
             </a:xfrm>
             <a:prstGeom prst="straightConnector1">
               <a:avLst/>
@@ -3324,7 +3324,7 @@
             <a:p>
               <a:pPr algn="ctr"/>
               <a:r>
-                <a:rPr lang="en-US" dirty="0"/>
+                <a:rPr lang="en-US" sz="2000" dirty="0"/>
                 <a:t>Hybrid tracking controller</a:t>
               </a:r>
             </a:p>
@@ -3341,8 +3341,8 @@
           </p:nvCxnSpPr>
           <p:spPr>
             <a:xfrm rot="5400000">
-              <a:off x="4466691" y="452926"/>
-              <a:ext cx="601036" cy="6256953"/>
+              <a:off x="4548887" y="535122"/>
+              <a:ext cx="601036" cy="6092560"/>
             </a:xfrm>
             <a:prstGeom prst="bentConnector2">
               <a:avLst/>
@@ -3377,9 +3377,9 @@
             <p:nvPr/>
           </p:nvCxnSpPr>
           <p:spPr>
-            <a:xfrm>
-              <a:off x="1659096" y="1669551"/>
-              <a:ext cx="1500207" cy="0"/>
+            <a:xfrm flipV="1">
+              <a:off x="1803126" y="1661202"/>
+              <a:ext cx="1502670" cy="8349"/>
             </a:xfrm>
             <a:prstGeom prst="straightConnector1">
               <a:avLst/>
@@ -3411,8 +3411,8 @@
           </p:nvSpPr>
           <p:spPr>
             <a:xfrm>
-              <a:off x="6794933" y="491262"/>
-              <a:ext cx="1388457" cy="584775"/>
+              <a:off x="6487322" y="497876"/>
+              <a:ext cx="1388457" cy="646331"/>
             </a:xfrm>
             <a:prstGeom prst="rect">
               <a:avLst/>
@@ -3426,7 +3426,7 @@
             <a:lstStyle/>
             <a:p>
               <a:r>
-                <a:rPr lang="en-US" sz="1600" dirty="0">
+                <a:rPr lang="en-US" dirty="0">
                   <a:latin typeface="Times New Roman" panose="02020603050405020304" pitchFamily="18" charset="0"/>
                   <a:cs typeface="Times New Roman" panose="02020603050405020304" pitchFamily="18" charset="0"/>
                 </a:rPr>
@@ -3443,8 +3443,8 @@
           </p:nvSpPr>
           <p:spPr>
             <a:xfrm>
-              <a:off x="5174293" y="1314697"/>
-              <a:ext cx="1949573" cy="338554"/>
+              <a:off x="5133068" y="1314697"/>
+              <a:ext cx="2165978" cy="369332"/>
             </a:xfrm>
             <a:prstGeom prst="rect">
               <a:avLst/>
@@ -3458,7 +3458,7 @@
             <a:lstStyle/>
             <a:p>
               <a:r>
-                <a:rPr lang="en-US" sz="1600" dirty="0">
+                <a:rPr lang="en-US" dirty="0">
                   <a:latin typeface="Times New Roman" panose="02020603050405020304" pitchFamily="18" charset="0"/>
                   <a:cs typeface="Times New Roman" panose="02020603050405020304" pitchFamily="18" charset="0"/>
                 </a:rPr>
@@ -3475,8 +3475,8 @@
           </p:nvSpPr>
           <p:spPr>
             <a:xfrm>
-              <a:off x="7082641" y="3492118"/>
-              <a:ext cx="813043" cy="338554"/>
+              <a:off x="6985792" y="3528966"/>
+              <a:ext cx="889987" cy="369332"/>
             </a:xfrm>
             <a:prstGeom prst="rect">
               <a:avLst/>
@@ -3490,7 +3490,7 @@
             <a:lstStyle/>
             <a:p>
               <a:r>
-                <a:rPr lang="en-US" sz="1600" dirty="0">
+                <a:rPr lang="en-US" dirty="0">
                   <a:latin typeface="Times New Roman" panose="02020603050405020304" pitchFamily="18" charset="0"/>
                   <a:cs typeface="Times New Roman" panose="02020603050405020304" pitchFamily="18" charset="0"/>
                 </a:rPr>
@@ -3507,8 +3507,8 @@
           </p:nvSpPr>
           <p:spPr>
             <a:xfrm>
-              <a:off x="1062458" y="3069650"/>
-              <a:ext cx="596638" cy="338554"/>
+              <a:off x="1171734" y="2983470"/>
+              <a:ext cx="646331" cy="369332"/>
             </a:xfrm>
             <a:prstGeom prst="rect">
               <a:avLst/>
@@ -3522,7 +3522,7 @@
             <a:lstStyle/>
             <a:p>
               <a:r>
-                <a:rPr lang="en-US" sz="1600" dirty="0">
+                <a:rPr lang="en-US" dirty="0">
                   <a:latin typeface="Times New Roman" panose="02020603050405020304" pitchFamily="18" charset="0"/>
                   <a:cs typeface="Times New Roman" panose="02020603050405020304" pitchFamily="18" charset="0"/>
                 </a:rPr>
@@ -3539,8 +3539,8 @@
           </p:nvSpPr>
           <p:spPr>
             <a:xfrm>
-              <a:off x="1732135" y="1309880"/>
-              <a:ext cx="1378904" cy="338554"/>
+              <a:off x="1796463" y="1317939"/>
+              <a:ext cx="1524776" cy="369332"/>
             </a:xfrm>
             <a:prstGeom prst="rect">
               <a:avLst/>
@@ -3554,13 +3554,13 @@
             <a:lstStyle/>
             <a:p>
               <a:r>
-                <a:rPr lang="en-US" sz="1600" dirty="0" smtClean="0">
+                <a:rPr lang="en-US" dirty="0" smtClean="0">
                   <a:latin typeface="Times New Roman" panose="02020603050405020304" pitchFamily="18" charset="0"/>
                   <a:cs typeface="Times New Roman" panose="02020603050405020304" pitchFamily="18" charset="0"/>
                 </a:rPr>
                 <a:t>Planning State</a:t>
               </a:r>
-              <a:endParaRPr lang="en-US" sz="1600" dirty="0">
+              <a:endParaRPr lang="en-US" dirty="0">
                 <a:latin typeface="Times New Roman" panose="02020603050405020304" pitchFamily="18" charset="0"/>
                 <a:cs typeface="Times New Roman" panose="02020603050405020304" pitchFamily="18" charset="0"/>
               </a:endParaRPr>
@@ -3575,8 +3575,8 @@
           </p:nvSpPr>
           <p:spPr>
             <a:xfrm>
-              <a:off x="4030809" y="2318930"/>
-              <a:ext cx="2024913" cy="338554"/>
+              <a:off x="4237988" y="2328692"/>
+              <a:ext cx="2249334" cy="369332"/>
             </a:xfrm>
             <a:prstGeom prst="rect">
               <a:avLst/>
@@ -3590,21 +3590,21 @@
             <a:lstStyle/>
             <a:p>
               <a:r>
-                <a:rPr lang="en-US" sz="1600" dirty="0">
+                <a:rPr lang="en-US" dirty="0">
                   <a:latin typeface="Times New Roman" panose="02020603050405020304" pitchFamily="18" charset="0"/>
                   <a:cs typeface="Times New Roman" panose="02020603050405020304" pitchFamily="18" charset="0"/>
                 </a:rPr>
                 <a:t>Desired </a:t>
               </a:r>
               <a:r>
-                <a:rPr lang="en-US" sz="1600" dirty="0" smtClean="0">
+                <a:rPr lang="en-US" dirty="0" smtClean="0">
                   <a:latin typeface="Times New Roman" panose="02020603050405020304" pitchFamily="18" charset="0"/>
                   <a:cs typeface="Times New Roman" panose="02020603050405020304" pitchFamily="18" charset="0"/>
                 </a:rPr>
                 <a:t>planning </a:t>
               </a:r>
               <a:r>
-                <a:rPr lang="en-US" sz="1600" dirty="0">
+                <a:rPr lang="en-US" dirty="0">
                   <a:latin typeface="Times New Roman" panose="02020603050405020304" pitchFamily="18" charset="0"/>
                   <a:cs typeface="Times New Roman" panose="02020603050405020304" pitchFamily="18" charset="0"/>
                 </a:rPr>
@@ -3665,8 +3665,8 @@
           </p:nvCxnSpPr>
           <p:spPr>
             <a:xfrm rot="16200000" flipH="1">
-              <a:off x="5237898" y="924027"/>
-              <a:ext cx="530388" cy="2935835"/>
+              <a:off x="5337575" y="1015733"/>
+              <a:ext cx="545548" cy="2750885"/>
             </a:xfrm>
             <a:prstGeom prst="bentConnector2">
               <a:avLst/>
@@ -3699,7 +3699,7 @@
         </p:nvSpPr>
         <p:spPr>
           <a:xfrm>
-            <a:off x="6694761" y="950489"/>
+            <a:off x="6694885" y="921990"/>
             <a:ext cx="1584730" cy="914401"/>
           </a:xfrm>
           <a:prstGeom prst="roundRect">
@@ -3726,7 +3726,7 @@
           <a:p>
             <a:pPr algn="ctr"/>
             <a:r>
-              <a:rPr lang="en-US" dirty="0"/>
+              <a:rPr lang="en-US" sz="2000" dirty="0"/>
               <a:t>Tracking error bound</a:t>
             </a:r>
           </a:p>

</xml_diff>